<commit_message>
almost complete the lay report
</commit_message>
<xml_diff>
--- a/Slides/Whizz_oxford.pptx
+++ b/Slides/Whizz_oxford.pptx
@@ -1943,15 +1943,7 @@
           <a:pPr algn="l"/>
           <a:r>
             <a:rPr lang="en-GB" sz="1300" dirty="0" smtClean="0"/>
-            <a:t>Customer retention strategies </a:t>
-          </a:r>
-          <a:r>
-            <a:rPr lang="en-GB" sz="1300" dirty="0" smtClean="0"/>
-            <a:t>targeting </a:t>
-          </a:r>
-          <a:r>
-            <a:rPr lang="en-GB" sz="1300" dirty="0" smtClean="0"/>
-            <a:t>on </a:t>
+            <a:t>Customer retention strategies targeting on </a:t>
           </a:r>
           <a:r>
             <a:rPr lang="en-GB" sz="1300" b="1" i="1" dirty="0" smtClean="0">
@@ -2526,6 +2518,13 @@
         </dgm:presLayoutVars>
       </dgm:prSet>
       <dgm:spPr/>
+      <dgm:t>
+        <a:bodyPr/>
+        <a:lstStyle/>
+        <a:p>
+          <a:endParaRPr lang="en-US"/>
+        </a:p>
+      </dgm:t>
     </dgm:pt>
     <dgm:pt modelId="{544A8AE4-A5EA-4150-B459-B4143E79C380}" type="pres">
       <dgm:prSet presAssocID="{F0ADA4E3-22E8-4E90-8A26-C617B094CAA1}" presName="composite" presStyleCnt="0"/>
@@ -2725,23 +2724,23 @@
     </dgm:pt>
   </dgm:ptLst>
   <dgm:cxnLst>
+    <dgm:cxn modelId="{1EA81529-3209-4A4B-B339-283BD18B2740}" srcId="{F0ADA4E3-22E8-4E90-8A26-C617B094CAA1}" destId="{1AC159E5-7BA0-4FE6-9143-30E1AD2DE31D}" srcOrd="0" destOrd="0" parTransId="{339BBE0F-9570-40B1-BF17-2345ED5D5552}" sibTransId="{DF4BB9D2-E84E-4E13-AEF2-862AFAA44599}"/>
+    <dgm:cxn modelId="{4FBFCDC9-9681-499A-9FD6-BD398078DC63}" type="presOf" srcId="{48791626-D3D2-4988-99A2-9DE32F543478}" destId="{C3DC1CF0-1348-46B3-BCF2-1816FFBAB5C9}" srcOrd="0" destOrd="0" presId="urn:microsoft.com/office/officeart/2008/layout/IncreasingCircleProcess"/>
+    <dgm:cxn modelId="{14F4A2CE-66B1-4D02-8FE4-46722DECC8AE}" srcId="{EE814951-0B41-4A52-AC8E-09B34A29525A}" destId="{31656302-D75D-42FB-8CDB-C30F67EAEADC}" srcOrd="3" destOrd="0" parTransId="{72F3AD42-37DD-4EE4-9471-E0DF1D5110ED}" sibTransId="{B97C2EBD-E7CC-46E6-AB44-E5A64808991A}"/>
+    <dgm:cxn modelId="{3D5E16AC-C589-4177-B176-88048FE3B4DB}" type="presOf" srcId="{F0ADA4E3-22E8-4E90-8A26-C617B094CAA1}" destId="{F55C5632-801E-4D56-8F0A-CE293BA2FD51}" srcOrd="0" destOrd="0" presId="urn:microsoft.com/office/officeart/2008/layout/IncreasingCircleProcess"/>
+    <dgm:cxn modelId="{0F2D92A2-02B2-4073-BB97-CD0655E6DF74}" type="presOf" srcId="{1AC159E5-7BA0-4FE6-9143-30E1AD2DE31D}" destId="{4AA677D2-BB92-445A-AB71-423DED7FC76D}" srcOrd="0" destOrd="0" presId="urn:microsoft.com/office/officeart/2008/layout/IncreasingCircleProcess"/>
     <dgm:cxn modelId="{D0AF49B6-CA61-4E65-B8C5-F77C71725140}" type="presOf" srcId="{8E09140D-CBFA-40E1-BB66-A1C9A7530FC6}" destId="{99A17055-0E3B-4496-B68B-C92039F9A256}" srcOrd="0" destOrd="0" presId="urn:microsoft.com/office/officeart/2008/layout/IncreasingCircleProcess"/>
-    <dgm:cxn modelId="{2D32B886-D27B-4343-891A-F53160AA7283}" srcId="{EE814951-0B41-4A52-AC8E-09B34A29525A}" destId="{DC04BB52-37B2-4AB9-AD36-C68324090932}" srcOrd="2" destOrd="0" parTransId="{DCC97A1E-EE66-44DF-A1DE-726C258D6791}" sibTransId="{DB75F015-2F22-4EBC-8F75-63CBE8977798}"/>
-    <dgm:cxn modelId="{DF2B8C21-0F6F-4A48-B752-00100706882F}" type="presOf" srcId="{31656302-D75D-42FB-8CDB-C30F67EAEADC}" destId="{F7937211-8CAE-4D2D-AB76-3B12E196D955}" srcOrd="0" destOrd="0" presId="urn:microsoft.com/office/officeart/2008/layout/IncreasingCircleProcess"/>
-    <dgm:cxn modelId="{BBC1D20E-99D0-4D53-92C9-6AA688FB0C9B}" type="presOf" srcId="{9062B66C-764F-4F9C-AC7F-B5218E41A59F}" destId="{D8ED7C86-D1D4-4182-921F-C8875BD447D7}" srcOrd="0" destOrd="0" presId="urn:microsoft.com/office/officeart/2008/layout/IncreasingCircleProcess"/>
+    <dgm:cxn modelId="{AAE19BBA-E4CC-4CEC-BE13-7DB1A0F062EA}" type="presOf" srcId="{3CFE336E-2480-480D-9A4D-C8A29E976A1A}" destId="{9EE98974-0189-4ED3-8465-930354F4DAEA}" srcOrd="0" destOrd="0" presId="urn:microsoft.com/office/officeart/2008/layout/IncreasingCircleProcess"/>
+    <dgm:cxn modelId="{E9974986-1D1F-477D-898D-A60EEB1307DA}" srcId="{8E09140D-CBFA-40E1-BB66-A1C9A7530FC6}" destId="{9062B66C-764F-4F9C-AC7F-B5218E41A59F}" srcOrd="0" destOrd="0" parTransId="{603DF5EE-1CED-4A18-ACC5-0A557A2CA420}" sibTransId="{1B17C603-962D-4360-AD2C-CA053250F9AC}"/>
+    <dgm:cxn modelId="{8A8D786F-46D2-452F-AFE9-B391C424D6A3}" srcId="{31656302-D75D-42FB-8CDB-C30F67EAEADC}" destId="{3CFE336E-2480-480D-9A4D-C8A29E976A1A}" srcOrd="0" destOrd="0" parTransId="{22A711D4-3434-4A1F-9E2D-96CE7B0851C7}" sibTransId="{FDDFA4EF-9FC8-4064-A10E-0BBE5F7E1653}"/>
+    <dgm:cxn modelId="{8291F396-DA62-4D81-B511-328E6A84691F}" srcId="{EE814951-0B41-4A52-AC8E-09B34A29525A}" destId="{8E09140D-CBFA-40E1-BB66-A1C9A7530FC6}" srcOrd="1" destOrd="0" parTransId="{FF871613-3DE0-4198-A6DF-D9AC5B5A699C}" sibTransId="{D19CFC82-C1A1-46BE-A3B3-67F4076B0EAC}"/>
     <dgm:cxn modelId="{F6518830-0FEC-4653-BABD-20F3B2BA7AEC}" srcId="{DC04BB52-37B2-4AB9-AD36-C68324090932}" destId="{48791626-D3D2-4988-99A2-9DE32F543478}" srcOrd="0" destOrd="0" parTransId="{457903A9-18A2-418B-B0C2-99CA3569ADCD}" sibTransId="{E5B00F75-3CB9-48B3-A773-A39AB84BE5F7}"/>
     <dgm:cxn modelId="{F7FA9E20-BFD6-4DE8-9F03-1BD59DD4606B}" type="presOf" srcId="{EE814951-0B41-4A52-AC8E-09B34A29525A}" destId="{4E174DBA-E814-4440-A90D-1FC392A8BCB2}" srcOrd="0" destOrd="0" presId="urn:microsoft.com/office/officeart/2008/layout/IncreasingCircleProcess"/>
-    <dgm:cxn modelId="{3D5E16AC-C589-4177-B176-88048FE3B4DB}" type="presOf" srcId="{F0ADA4E3-22E8-4E90-8A26-C617B094CAA1}" destId="{F55C5632-801E-4D56-8F0A-CE293BA2FD51}" srcOrd="0" destOrd="0" presId="urn:microsoft.com/office/officeart/2008/layout/IncreasingCircleProcess"/>
-    <dgm:cxn modelId="{4FBFCDC9-9681-499A-9FD6-BD398078DC63}" type="presOf" srcId="{48791626-D3D2-4988-99A2-9DE32F543478}" destId="{C3DC1CF0-1348-46B3-BCF2-1816FFBAB5C9}" srcOrd="0" destOrd="0" presId="urn:microsoft.com/office/officeart/2008/layout/IncreasingCircleProcess"/>
-    <dgm:cxn modelId="{8291F396-DA62-4D81-B511-328E6A84691F}" srcId="{EE814951-0B41-4A52-AC8E-09B34A29525A}" destId="{8E09140D-CBFA-40E1-BB66-A1C9A7530FC6}" srcOrd="1" destOrd="0" parTransId="{FF871613-3DE0-4198-A6DF-D9AC5B5A699C}" sibTransId="{D19CFC82-C1A1-46BE-A3B3-67F4076B0EAC}"/>
-    <dgm:cxn modelId="{14F4A2CE-66B1-4D02-8FE4-46722DECC8AE}" srcId="{EE814951-0B41-4A52-AC8E-09B34A29525A}" destId="{31656302-D75D-42FB-8CDB-C30F67EAEADC}" srcOrd="3" destOrd="0" parTransId="{72F3AD42-37DD-4EE4-9471-E0DF1D5110ED}" sibTransId="{B97C2EBD-E7CC-46E6-AB44-E5A64808991A}"/>
-    <dgm:cxn modelId="{E9974986-1D1F-477D-898D-A60EEB1307DA}" srcId="{8E09140D-CBFA-40E1-BB66-A1C9A7530FC6}" destId="{9062B66C-764F-4F9C-AC7F-B5218E41A59F}" srcOrd="0" destOrd="0" parTransId="{603DF5EE-1CED-4A18-ACC5-0A557A2CA420}" sibTransId="{1B17C603-962D-4360-AD2C-CA053250F9AC}"/>
+    <dgm:cxn modelId="{57D58A15-828B-419C-AC13-35073A6FDBE9}" type="presOf" srcId="{DC04BB52-37B2-4AB9-AD36-C68324090932}" destId="{55035CAE-C741-40D5-886E-AEBB1E533C71}" srcOrd="0" destOrd="0" presId="urn:microsoft.com/office/officeart/2008/layout/IncreasingCircleProcess"/>
+    <dgm:cxn modelId="{BBC1D20E-99D0-4D53-92C9-6AA688FB0C9B}" type="presOf" srcId="{9062B66C-764F-4F9C-AC7F-B5218E41A59F}" destId="{D8ED7C86-D1D4-4182-921F-C8875BD447D7}" srcOrd="0" destOrd="0" presId="urn:microsoft.com/office/officeart/2008/layout/IncreasingCircleProcess"/>
+    <dgm:cxn modelId="{DF2B8C21-0F6F-4A48-B752-00100706882F}" type="presOf" srcId="{31656302-D75D-42FB-8CDB-C30F67EAEADC}" destId="{F7937211-8CAE-4D2D-AB76-3B12E196D955}" srcOrd="0" destOrd="0" presId="urn:microsoft.com/office/officeart/2008/layout/IncreasingCircleProcess"/>
     <dgm:cxn modelId="{F62FE7D5-76B1-42C1-ACBF-04010C20C2F6}" srcId="{EE814951-0B41-4A52-AC8E-09B34A29525A}" destId="{F0ADA4E3-22E8-4E90-8A26-C617B094CAA1}" srcOrd="0" destOrd="0" parTransId="{709F5821-8FB1-420A-BFAF-6D9134C04870}" sibTransId="{ABBAC5E7-DFCB-4780-B14F-ACD80D8C0B5C}"/>
-    <dgm:cxn modelId="{0F2D92A2-02B2-4073-BB97-CD0655E6DF74}" type="presOf" srcId="{1AC159E5-7BA0-4FE6-9143-30E1AD2DE31D}" destId="{4AA677D2-BB92-445A-AB71-423DED7FC76D}" srcOrd="0" destOrd="0" presId="urn:microsoft.com/office/officeart/2008/layout/IncreasingCircleProcess"/>
-    <dgm:cxn modelId="{AAE19BBA-E4CC-4CEC-BE13-7DB1A0F062EA}" type="presOf" srcId="{3CFE336E-2480-480D-9A4D-C8A29E976A1A}" destId="{9EE98974-0189-4ED3-8465-930354F4DAEA}" srcOrd="0" destOrd="0" presId="urn:microsoft.com/office/officeart/2008/layout/IncreasingCircleProcess"/>
-    <dgm:cxn modelId="{1EA81529-3209-4A4B-B339-283BD18B2740}" srcId="{F0ADA4E3-22E8-4E90-8A26-C617B094CAA1}" destId="{1AC159E5-7BA0-4FE6-9143-30E1AD2DE31D}" srcOrd="0" destOrd="0" parTransId="{339BBE0F-9570-40B1-BF17-2345ED5D5552}" sibTransId="{DF4BB9D2-E84E-4E13-AEF2-862AFAA44599}"/>
-    <dgm:cxn modelId="{8A8D786F-46D2-452F-AFE9-B391C424D6A3}" srcId="{31656302-D75D-42FB-8CDB-C30F67EAEADC}" destId="{3CFE336E-2480-480D-9A4D-C8A29E976A1A}" srcOrd="0" destOrd="0" parTransId="{22A711D4-3434-4A1F-9E2D-96CE7B0851C7}" sibTransId="{FDDFA4EF-9FC8-4064-A10E-0BBE5F7E1653}"/>
-    <dgm:cxn modelId="{57D58A15-828B-419C-AC13-35073A6FDBE9}" type="presOf" srcId="{DC04BB52-37B2-4AB9-AD36-C68324090932}" destId="{55035CAE-C741-40D5-886E-AEBB1E533C71}" srcOrd="0" destOrd="0" presId="urn:microsoft.com/office/officeart/2008/layout/IncreasingCircleProcess"/>
+    <dgm:cxn modelId="{2D32B886-D27B-4343-891A-F53160AA7283}" srcId="{EE814951-0B41-4A52-AC8E-09B34A29525A}" destId="{DC04BB52-37B2-4AB9-AD36-C68324090932}" srcOrd="2" destOrd="0" parTransId="{DCC97A1E-EE66-44DF-A1DE-726C258D6791}" sibTransId="{DB75F015-2F22-4EBC-8F75-63CBE8977798}"/>
     <dgm:cxn modelId="{0293719D-E75A-4CBE-80A5-C15A18C25AF0}" type="presParOf" srcId="{4E174DBA-E814-4440-A90D-1FC392A8BCB2}" destId="{544A8AE4-A5EA-4150-B459-B4143E79C380}" srcOrd="0" destOrd="0" presId="urn:microsoft.com/office/officeart/2008/layout/IncreasingCircleProcess"/>
     <dgm:cxn modelId="{549F0D58-D495-45B6-8CB4-4F62D6747B08}" type="presParOf" srcId="{544A8AE4-A5EA-4150-B459-B4143E79C380}" destId="{526E3FE7-0C24-444B-8378-4C5350B580FD}" srcOrd="0" destOrd="0" presId="urn:microsoft.com/office/officeart/2008/layout/IncreasingCircleProcess"/>
     <dgm:cxn modelId="{1B11A535-7F08-4836-8C82-6B946EC6F999}" type="presParOf" srcId="{544A8AE4-A5EA-4150-B459-B4143E79C380}" destId="{985612B4-0968-4CB2-A531-13B81DBE09FD}" srcOrd="1" destOrd="0" presId="urn:microsoft.com/office/officeart/2008/layout/IncreasingCircleProcess"/>
@@ -3026,15 +3025,7 @@
           </a:pPr>
           <a:r>
             <a:rPr lang="en-GB" sz="1300" kern="1200" dirty="0" smtClean="0"/>
-            <a:t>Customer retention strategies </a:t>
-          </a:r>
-          <a:r>
-            <a:rPr lang="en-GB" sz="1300" kern="1200" dirty="0" smtClean="0"/>
-            <a:t>targeting </a:t>
-          </a:r>
-          <a:r>
-            <a:rPr lang="en-GB" sz="1300" kern="1200" dirty="0" smtClean="0"/>
-            <a:t>on </a:t>
+            <a:t>Customer retention strategies targeting on </a:t>
           </a:r>
           <a:r>
             <a:rPr lang="en-GB" sz="1300" b="1" i="1" kern="1200" dirty="0" smtClean="0">
@@ -11416,7 +11407,7 @@
           <a:p>
             <a:fld id="{ED748905-54C2-4075-AEDD-602565ABB1B4}" type="datetimeFigureOut">
               <a:rPr lang="en-GB" smtClean="0"/>
-              <a:t>11/06/2018</a:t>
+              <a:t>20/06/2018</a:t>
             </a:fld>
             <a:endParaRPr lang="en-GB"/>
           </a:p>
@@ -11633,7 +11624,7 @@
           <a:p>
             <a:fld id="{ED748905-54C2-4075-AEDD-602565ABB1B4}" type="datetimeFigureOut">
               <a:rPr lang="en-GB" smtClean="0"/>
-              <a:t>11/06/2018</a:t>
+              <a:t>20/06/2018</a:t>
             </a:fld>
             <a:endParaRPr lang="en-GB"/>
           </a:p>
@@ -11843,7 +11834,7 @@
           <a:p>
             <a:fld id="{ED748905-54C2-4075-AEDD-602565ABB1B4}" type="datetimeFigureOut">
               <a:rPr lang="en-GB" smtClean="0"/>
-              <a:t>11/06/2018</a:t>
+              <a:t>20/06/2018</a:t>
             </a:fld>
             <a:endParaRPr lang="en-GB"/>
           </a:p>
@@ -12115,7 +12106,7 @@
           <a:p>
             <a:fld id="{1F83D633-8A9A-4CCC-9611-5501EFDB392A}" type="datetimeFigureOut">
               <a:rPr lang="en-GB" smtClean="0"/>
-              <a:t>11/06/2018</a:t>
+              <a:t>20/06/2018</a:t>
             </a:fld>
             <a:endParaRPr lang="en-GB" dirty="0"/>
           </a:p>
@@ -12332,7 +12323,7 @@
           <a:p>
             <a:fld id="{1F83D633-8A9A-4CCC-9611-5501EFDB392A}" type="datetimeFigureOut">
               <a:rPr lang="en-GB" smtClean="0"/>
-              <a:t>11/06/2018</a:t>
+              <a:t>20/06/2018</a:t>
             </a:fld>
             <a:endParaRPr lang="en-GB"/>
           </a:p>
@@ -12608,7 +12599,7 @@
           <a:p>
             <a:fld id="{1F83D633-8A9A-4CCC-9611-5501EFDB392A}" type="datetimeFigureOut">
               <a:rPr lang="en-GB" smtClean="0"/>
-              <a:t>11/06/2018</a:t>
+              <a:t>20/06/2018</a:t>
             </a:fld>
             <a:endParaRPr lang="en-GB"/>
           </a:p>
@@ -12934,7 +12925,7 @@
           <a:p>
             <a:fld id="{1F83D633-8A9A-4CCC-9611-5501EFDB392A}" type="datetimeFigureOut">
               <a:rPr lang="en-GB" smtClean="0"/>
-              <a:t>11/06/2018</a:t>
+              <a:t>20/06/2018</a:t>
             </a:fld>
             <a:endParaRPr lang="en-GB"/>
           </a:p>
@@ -13400,7 +13391,7 @@
           <a:p>
             <a:fld id="{1F83D633-8A9A-4CCC-9611-5501EFDB392A}" type="datetimeFigureOut">
               <a:rPr lang="en-GB" smtClean="0"/>
-              <a:t>11/06/2018</a:t>
+              <a:t>20/06/2018</a:t>
             </a:fld>
             <a:endParaRPr lang="en-GB"/>
           </a:p>
@@ -13550,7 +13541,7 @@
           <a:p>
             <a:fld id="{1F83D633-8A9A-4CCC-9611-5501EFDB392A}" type="datetimeFigureOut">
               <a:rPr lang="en-GB" smtClean="0"/>
-              <a:t>11/06/2018</a:t>
+              <a:t>20/06/2018</a:t>
             </a:fld>
             <a:endParaRPr lang="en-GB"/>
           </a:p>
@@ -13669,7 +13660,7 @@
           <a:p>
             <a:fld id="{1F83D633-8A9A-4CCC-9611-5501EFDB392A}" type="datetimeFigureOut">
               <a:rPr lang="en-GB" smtClean="0"/>
-              <a:t>11/06/2018</a:t>
+              <a:t>20/06/2018</a:t>
             </a:fld>
             <a:endParaRPr lang="en-GB"/>
           </a:p>
@@ -13979,7 +13970,7 @@
           <a:p>
             <a:fld id="{1F83D633-8A9A-4CCC-9611-5501EFDB392A}" type="datetimeFigureOut">
               <a:rPr lang="en-GB" smtClean="0"/>
-              <a:t>11/06/2018</a:t>
+              <a:t>20/06/2018</a:t>
             </a:fld>
             <a:endParaRPr lang="en-GB"/>
           </a:p>
@@ -14189,7 +14180,7 @@
           <a:p>
             <a:fld id="{ED748905-54C2-4075-AEDD-602565ABB1B4}" type="datetimeFigureOut">
               <a:rPr lang="en-GB" smtClean="0"/>
-              <a:t>11/06/2018</a:t>
+              <a:t>20/06/2018</a:t>
             </a:fld>
             <a:endParaRPr lang="en-GB"/>
           </a:p>
@@ -14482,7 +14473,7 @@
           <a:p>
             <a:fld id="{1F83D633-8A9A-4CCC-9611-5501EFDB392A}" type="datetimeFigureOut">
               <a:rPr lang="en-GB" smtClean="0"/>
-              <a:t>11/06/2018</a:t>
+              <a:t>20/06/2018</a:t>
             </a:fld>
             <a:endParaRPr lang="en-GB"/>
           </a:p>
@@ -14692,7 +14683,7 @@
           <a:p>
             <a:fld id="{1F83D633-8A9A-4CCC-9611-5501EFDB392A}" type="datetimeFigureOut">
               <a:rPr lang="en-GB" smtClean="0"/>
-              <a:t>11/06/2018</a:t>
+              <a:t>20/06/2018</a:t>
             </a:fld>
             <a:endParaRPr lang="en-GB"/>
           </a:p>
@@ -14902,7 +14893,7 @@
           <a:p>
             <a:fld id="{1F83D633-8A9A-4CCC-9611-5501EFDB392A}" type="datetimeFigureOut">
               <a:rPr lang="en-GB" smtClean="0"/>
-              <a:t>11/06/2018</a:t>
+              <a:t>20/06/2018</a:t>
             </a:fld>
             <a:endParaRPr lang="en-GB"/>
           </a:p>
@@ -15160,7 +15151,7 @@
           <a:p>
             <a:fld id="{C92A6B7D-1812-4457-B448-12973DD2C064}" type="datetimeFigureOut">
               <a:rPr lang="en-GB" smtClean="0"/>
-              <a:t>11/06/2018</a:t>
+              <a:t>20/06/2018</a:t>
             </a:fld>
             <a:endParaRPr lang="en-GB"/>
           </a:p>
@@ -15330,7 +15321,7 @@
           <a:p>
             <a:fld id="{C92A6B7D-1812-4457-B448-12973DD2C064}" type="datetimeFigureOut">
               <a:rPr lang="en-GB" smtClean="0"/>
-              <a:t>11/06/2018</a:t>
+              <a:t>20/06/2018</a:t>
             </a:fld>
             <a:endParaRPr lang="en-GB"/>
           </a:p>
@@ -15576,7 +15567,7 @@
           <a:p>
             <a:fld id="{C92A6B7D-1812-4457-B448-12973DD2C064}" type="datetimeFigureOut">
               <a:rPr lang="en-GB" smtClean="0"/>
-              <a:t>11/06/2018</a:t>
+              <a:t>20/06/2018</a:t>
             </a:fld>
             <a:endParaRPr lang="en-GB"/>
           </a:p>
@@ -15864,7 +15855,7 @@
           <a:p>
             <a:fld id="{C92A6B7D-1812-4457-B448-12973DD2C064}" type="datetimeFigureOut">
               <a:rPr lang="en-GB" smtClean="0"/>
-              <a:t>11/06/2018</a:t>
+              <a:t>20/06/2018</a:t>
             </a:fld>
             <a:endParaRPr lang="en-GB"/>
           </a:p>
@@ -16286,7 +16277,7 @@
           <a:p>
             <a:fld id="{C92A6B7D-1812-4457-B448-12973DD2C064}" type="datetimeFigureOut">
               <a:rPr lang="en-GB" smtClean="0"/>
-              <a:t>11/06/2018</a:t>
+              <a:t>20/06/2018</a:t>
             </a:fld>
             <a:endParaRPr lang="en-GB"/>
           </a:p>
@@ -16404,7 +16395,7 @@
           <a:p>
             <a:fld id="{C92A6B7D-1812-4457-B448-12973DD2C064}" type="datetimeFigureOut">
               <a:rPr lang="en-GB" smtClean="0"/>
-              <a:t>11/06/2018</a:t>
+              <a:t>20/06/2018</a:t>
             </a:fld>
             <a:endParaRPr lang="en-GB"/>
           </a:p>
@@ -16499,7 +16490,7 @@
           <a:p>
             <a:fld id="{C92A6B7D-1812-4457-B448-12973DD2C064}" type="datetimeFigureOut">
               <a:rPr lang="en-GB" smtClean="0"/>
-              <a:t>11/06/2018</a:t>
+              <a:t>20/06/2018</a:t>
             </a:fld>
             <a:endParaRPr lang="en-GB"/>
           </a:p>
@@ -16759,7 +16750,7 @@
           <a:p>
             <a:fld id="{ED748905-54C2-4075-AEDD-602565ABB1B4}" type="datetimeFigureOut">
               <a:rPr lang="en-GB" smtClean="0"/>
-              <a:t>11/06/2018</a:t>
+              <a:t>20/06/2018</a:t>
             </a:fld>
             <a:endParaRPr lang="en-GB"/>
           </a:p>
@@ -17059,7 +17050,7 @@
           <a:p>
             <a:fld id="{C92A6B7D-1812-4457-B448-12973DD2C064}" type="datetimeFigureOut">
               <a:rPr lang="en-GB" smtClean="0"/>
-              <a:t>11/06/2018</a:t>
+              <a:t>20/06/2018</a:t>
             </a:fld>
             <a:endParaRPr lang="en-GB"/>
           </a:p>
@@ -17312,7 +17303,7 @@
           <a:p>
             <a:fld id="{C92A6B7D-1812-4457-B448-12973DD2C064}" type="datetimeFigureOut">
               <a:rPr lang="en-GB" smtClean="0"/>
-              <a:t>11/06/2018</a:t>
+              <a:t>20/06/2018</a:t>
             </a:fld>
             <a:endParaRPr lang="en-GB"/>
           </a:p>
@@ -17482,7 +17473,7 @@
           <a:p>
             <a:fld id="{C92A6B7D-1812-4457-B448-12973DD2C064}" type="datetimeFigureOut">
               <a:rPr lang="en-GB" smtClean="0"/>
-              <a:t>11/06/2018</a:t>
+              <a:t>20/06/2018</a:t>
             </a:fld>
             <a:endParaRPr lang="en-GB"/>
           </a:p>
@@ -17662,7 +17653,7 @@
           <a:p>
             <a:fld id="{C92A6B7D-1812-4457-B448-12973DD2C064}" type="datetimeFigureOut">
               <a:rPr lang="en-GB" smtClean="0"/>
-              <a:t>11/06/2018</a:t>
+              <a:t>20/06/2018</a:t>
             </a:fld>
             <a:endParaRPr lang="en-GB"/>
           </a:p>
@@ -17972,7 +17963,7 @@
           <a:p>
             <a:fld id="{ED748905-54C2-4075-AEDD-602565ABB1B4}" type="datetimeFigureOut">
               <a:rPr lang="en-GB" smtClean="0"/>
-              <a:t>11/06/2018</a:t>
+              <a:t>20/06/2018</a:t>
             </a:fld>
             <a:endParaRPr lang="en-GB"/>
           </a:p>
@@ -18438,7 +18429,7 @@
           <a:p>
             <a:fld id="{ED748905-54C2-4075-AEDD-602565ABB1B4}" type="datetimeFigureOut">
               <a:rPr lang="en-GB" smtClean="0"/>
-              <a:t>11/06/2018</a:t>
+              <a:t>20/06/2018</a:t>
             </a:fld>
             <a:endParaRPr lang="en-GB"/>
           </a:p>
@@ -18588,7 +18579,7 @@
           <a:p>
             <a:fld id="{ED748905-54C2-4075-AEDD-602565ABB1B4}" type="datetimeFigureOut">
               <a:rPr lang="en-GB" smtClean="0"/>
-              <a:t>11/06/2018</a:t>
+              <a:t>20/06/2018</a:t>
             </a:fld>
             <a:endParaRPr lang="en-GB"/>
           </a:p>
@@ -18714,7 +18705,7 @@
           <a:p>
             <a:fld id="{ED748905-54C2-4075-AEDD-602565ABB1B4}" type="datetimeFigureOut">
               <a:rPr lang="en-GB" smtClean="0"/>
-              <a:t>11/06/2018</a:t>
+              <a:t>20/06/2018</a:t>
             </a:fld>
             <a:endParaRPr lang="en-GB"/>
           </a:p>
@@ -19031,7 +19022,7 @@
           <a:p>
             <a:fld id="{ED748905-54C2-4075-AEDD-602565ABB1B4}" type="datetimeFigureOut">
               <a:rPr lang="en-GB" smtClean="0"/>
-              <a:t>11/06/2018</a:t>
+              <a:t>20/06/2018</a:t>
             </a:fld>
             <a:endParaRPr lang="en-GB"/>
           </a:p>
@@ -19317,7 +19308,7 @@
           <a:p>
             <a:fld id="{ED748905-54C2-4075-AEDD-602565ABB1B4}" type="datetimeFigureOut">
               <a:rPr lang="en-GB" smtClean="0"/>
-              <a:t>11/06/2018</a:t>
+              <a:t>20/06/2018</a:t>
             </a:fld>
             <a:endParaRPr lang="en-GB"/>
           </a:p>
@@ -21595,7 +21586,7 @@
           <a:p>
             <a:fld id="{C92A6B7D-1812-4457-B448-12973DD2C064}" type="datetimeFigureOut">
               <a:rPr lang="en-GB" smtClean="0"/>
-              <a:t>11/06/2018</a:t>
+              <a:t>20/06/2018</a:t>
             </a:fld>
             <a:endParaRPr lang="en-GB"/>
           </a:p>
@@ -21977,37 +21968,6 @@
           <a:chExt cx="0" cy="0"/>
         </a:xfrm>
       </p:grpSpPr>
-      <p:pic>
-        <p:nvPicPr>
-          <p:cNvPr id="7" name="Picture 6"/>
-          <p:cNvPicPr>
-            <a:picLocks noChangeAspect="1"/>
-          </p:cNvPicPr>
-          <p:nvPr/>
-        </p:nvPicPr>
-        <p:blipFill>
-          <a:blip r:embed="rId2" cstate="print">
-            <a:extLst>
-              <a:ext uri="{28A0092B-C50C-407E-A947-70E740481C1C}">
-                <a14:useLocalDpi xmlns:a14="http://schemas.microsoft.com/office/drawing/2010/main" val="0"/>
-              </a:ext>
-            </a:extLst>
-          </a:blip>
-          <a:stretch>
-            <a:fillRect/>
-          </a:stretch>
-        </p:blipFill>
-        <p:spPr>
-          <a:xfrm>
-            <a:off x="2390410" y="2419400"/>
-            <a:ext cx="5078796" cy="3385864"/>
-          </a:xfrm>
-          <a:prstGeom prst="rect">
-            <a:avLst/>
-          </a:prstGeom>
-          <a:effectLst/>
-        </p:spPr>
-      </p:pic>
       <p:sp>
         <p:nvSpPr>
           <p:cNvPr id="2" name="Title 1"/>
@@ -22051,7 +22011,7 @@
           <p:nvPr/>
         </p:nvPicPr>
         <p:blipFill>
-          <a:blip r:embed="rId3" cstate="print">
+          <a:blip r:embed="rId2" cstate="print">
             <a:extLst>
               <a:ext uri="{28A0092B-C50C-407E-A947-70E740481C1C}">
                 <a14:useLocalDpi xmlns:a14="http://schemas.microsoft.com/office/drawing/2010/main" val="0"/>
@@ -23577,31 +23537,7 @@
                 <a:latin typeface="Arial" panose="020B0604020202020204" pitchFamily="34" charset="0"/>
                 <a:cs typeface="Arial" panose="020B0604020202020204" pitchFamily="34" charset="0"/>
               </a:rPr>
-              <a:t>Who</a:t>
-            </a:r>
-            <a:r>
-              <a:rPr lang="en-GB" sz="3600" b="1" dirty="0" smtClean="0">
-                <a:ln w="12700">
-                  <a:solidFill>
-                    <a:schemeClr val="accent5"/>
-                  </a:solidFill>
-                  <a:prstDash val="solid"/>
-                </a:ln>
-                <a:pattFill prst="ltDnDiag">
-                  <a:fgClr>
-                    <a:schemeClr val="accent5">
-                      <a:lumMod val="60000"/>
-                      <a:lumOff val="40000"/>
-                    </a:schemeClr>
-                  </a:fgClr>
-                  <a:bgClr>
-                    <a:schemeClr val="bg1"/>
-                  </a:bgClr>
-                </a:pattFill>
-                <a:latin typeface="Arial" panose="020B0604020202020204" pitchFamily="34" charset="0"/>
-                <a:cs typeface="Arial" panose="020B0604020202020204" pitchFamily="34" charset="0"/>
-              </a:rPr>
-              <a:t>?</a:t>
+              <a:t>Who?</a:t>
             </a:r>
           </a:p>
           <a:p>
@@ -23614,11 +23550,7 @@
             </a:pPr>
             <a:r>
               <a:rPr lang="en-GB" sz="1300" dirty="0" smtClean="0"/>
-              <a:t>Identify </a:t>
-            </a:r>
-            <a:r>
-              <a:rPr lang="en-GB" sz="1300" dirty="0" smtClean="0"/>
-              <a:t>customers most prone to cancel subscription</a:t>
+              <a:t>Identify customers most prone to cancel subscription</a:t>
             </a:r>
           </a:p>
           <a:p>
@@ -23682,31 +23614,7 @@
                 <a:latin typeface="Arial" panose="020B0604020202020204" pitchFamily="34" charset="0"/>
                 <a:cs typeface="Arial" panose="020B0604020202020204" pitchFamily="34" charset="0"/>
               </a:rPr>
-              <a:t>Why</a:t>
-            </a:r>
-            <a:r>
-              <a:rPr lang="en-GB" sz="3600" b="1" dirty="0" smtClean="0">
-                <a:ln w="12700">
-                  <a:solidFill>
-                    <a:schemeClr val="accent5"/>
-                  </a:solidFill>
-                  <a:prstDash val="solid"/>
-                </a:ln>
-                <a:pattFill prst="ltDnDiag">
-                  <a:fgClr>
-                    <a:schemeClr val="accent5">
-                      <a:lumMod val="60000"/>
-                      <a:lumOff val="40000"/>
-                    </a:schemeClr>
-                  </a:fgClr>
-                  <a:bgClr>
-                    <a:schemeClr val="bg1"/>
-                  </a:bgClr>
-                </a:pattFill>
-                <a:latin typeface="Arial" panose="020B0604020202020204" pitchFamily="34" charset="0"/>
-                <a:cs typeface="Arial" panose="020B0604020202020204" pitchFamily="34" charset="0"/>
-              </a:rPr>
-              <a:t>?</a:t>
+              <a:t>Why?</a:t>
             </a:r>
           </a:p>
           <a:p>
@@ -23723,11 +23631,7 @@
             </a:pPr>
             <a:r>
               <a:rPr lang="en-GB" sz="1300" dirty="0" smtClean="0"/>
-              <a:t>Analyse </a:t>
-            </a:r>
-            <a:r>
-              <a:rPr lang="en-GB" sz="1300" dirty="0" smtClean="0"/>
-              <a:t>critical reason triggering cancellation</a:t>
+              <a:t>Analyse critical reason triggering cancellation</a:t>
             </a:r>
           </a:p>
           <a:p>
@@ -24750,13 +24654,8 @@
             <a:p>
               <a:r>
                 <a:rPr lang="en-GB" sz="1300" dirty="0" smtClean="0"/>
-                <a:t>Subscribers make the choice to leave the service at the end of the subscription; otherwise </a:t>
+                <a:t>Subscribers make the choice to leave the service at the end of the subscription; otherwise auto-rolled</a:t>
               </a:r>
-              <a:r>
-                <a:rPr lang="en-GB" sz="1300" dirty="0" smtClean="0"/>
-                <a:t>auto-rolled</a:t>
-              </a:r>
-              <a:endParaRPr lang="en-GB" sz="1300" dirty="0" smtClean="0"/>
             </a:p>
           </p:txBody>
         </p:sp>
@@ -25189,7 +25088,6 @@
                 <a:rPr lang="en-GB" sz="1300" dirty="0" smtClean="0"/>
                 <a:t>Date of birth</a:t>
               </a:r>
-              <a:endParaRPr lang="en-GB" sz="1300" dirty="0" smtClean="0"/>
             </a:p>
           </p:txBody>
         </p:sp>
@@ -25364,7 +25262,6 @@
                 <a:rPr lang="en-GB" sz="1300" b="1" dirty="0" smtClean="0"/>
                 <a:t>Pupil</a:t>
               </a:r>
-              <a:endParaRPr lang="en-GB" sz="1300" b="1" dirty="0" smtClean="0"/>
             </a:p>
           </p:txBody>
         </p:sp>
@@ -25539,7 +25436,6 @@
                 <a:rPr lang="en-GB" sz="1300" dirty="0" smtClean="0"/>
                 <a:t>5685 pupils</a:t>
               </a:r>
-              <a:endParaRPr lang="en-GB" sz="1300" dirty="0" smtClean="0"/>
             </a:p>
           </p:txBody>
         </p:sp>
@@ -25740,7 +25636,6 @@
                 <a:rPr lang="en-GB" sz="1300" dirty="0" smtClean="0"/>
                 <a:t>End date</a:t>
               </a:r>
-              <a:endParaRPr lang="en-GB" sz="1300" dirty="0" smtClean="0"/>
             </a:p>
           </p:txBody>
         </p:sp>
@@ -25915,7 +25810,6 @@
                 <a:rPr lang="en-GB" sz="1300" b="1" dirty="0" smtClean="0"/>
                 <a:t>Subscription</a:t>
               </a:r>
-              <a:endParaRPr lang="en-GB" sz="1300" b="1" dirty="0" smtClean="0"/>
             </a:p>
           </p:txBody>
         </p:sp>
@@ -26090,7 +25984,6 @@
                 <a:rPr lang="en-GB" sz="1300" dirty="0" smtClean="0"/>
                 <a:t>28025 subscriptions</a:t>
               </a:r>
-              <a:endParaRPr lang="en-GB" sz="1300" dirty="0" smtClean="0"/>
             </a:p>
           </p:txBody>
         </p:sp>
@@ -26305,7 +26198,6 @@
                 <a:rPr lang="en-GB" sz="1300" dirty="0" smtClean="0"/>
                 <a:t>… </a:t>
               </a:r>
-              <a:endParaRPr lang="en-GB" sz="1300" dirty="0" smtClean="0"/>
             </a:p>
           </p:txBody>
         </p:sp>
@@ -26480,7 +26372,6 @@
                 <a:rPr lang="en-GB" sz="1300" b="1" dirty="0" smtClean="0"/>
                 <a:t>Lesson History</a:t>
               </a:r>
-              <a:endParaRPr lang="en-GB" sz="1300" b="1" dirty="0" smtClean="0"/>
             </a:p>
           </p:txBody>
         </p:sp>
@@ -26655,7 +26546,6 @@
                 <a:rPr lang="en-GB" sz="1300" dirty="0" smtClean="0"/>
                 <a:t>~1.6 million lesson activities </a:t>
               </a:r>
-              <a:endParaRPr lang="en-GB" sz="1300" dirty="0" smtClean="0"/>
             </a:p>
           </p:txBody>
         </p:sp>
@@ -27633,11 +27523,7 @@
               </a:pPr>
               <a:r>
                 <a:rPr lang="en-GB" sz="1300" dirty="0" smtClean="0"/>
-                <a:t>Custome</a:t>
-              </a:r>
-              <a:r>
-                <a:rPr lang="en-GB" sz="1300" dirty="0" smtClean="0"/>
-                <a:t>r A</a:t>
+                <a:t>Customer A</a:t>
               </a:r>
               <a:endParaRPr lang="en-US" sz="1300" dirty="0"/>
             </a:p>
@@ -28844,11 +28730,7 @@
               </a:pPr>
               <a:r>
                 <a:rPr lang="en-GB" sz="1300" dirty="0" smtClean="0"/>
-                <a:t>Custome</a:t>
-              </a:r>
-              <a:r>
-                <a:rPr lang="en-GB" sz="1300" dirty="0" smtClean="0"/>
-                <a:t>r B</a:t>
+                <a:t>Customer B</a:t>
               </a:r>
               <a:endParaRPr lang="en-US" sz="1300" dirty="0"/>
             </a:p>
@@ -30324,11 +30206,7 @@
               </a:pPr>
               <a:r>
                 <a:rPr lang="en-GB" sz="1300" dirty="0" smtClean="0"/>
-                <a:t>Custome</a:t>
-              </a:r>
-              <a:r>
-                <a:rPr lang="en-GB" sz="1300" dirty="0" smtClean="0"/>
-                <a:t>r C</a:t>
+                <a:t>Customer C</a:t>
               </a:r>
               <a:endParaRPr lang="en-US" sz="1300" dirty="0"/>
             </a:p>
@@ -31159,11 +31037,7 @@
               </a:pPr>
               <a:r>
                 <a:rPr lang="en-GB" sz="1300" dirty="0" smtClean="0"/>
-                <a:t>Custome</a:t>
-              </a:r>
-              <a:r>
-                <a:rPr lang="en-GB" sz="1300" dirty="0" smtClean="0"/>
-                <a:t>r A</a:t>
+                <a:t>Customer A</a:t>
               </a:r>
               <a:endParaRPr lang="en-US" sz="1300" dirty="0"/>
             </a:p>
@@ -32370,11 +32244,7 @@
               </a:pPr>
               <a:r>
                 <a:rPr lang="en-GB" sz="1300" dirty="0" smtClean="0"/>
-                <a:t>Custome</a:t>
-              </a:r>
-              <a:r>
-                <a:rPr lang="en-GB" sz="1300" dirty="0" smtClean="0"/>
-                <a:t>r B</a:t>
+                <a:t>Customer B</a:t>
               </a:r>
               <a:endParaRPr lang="en-US" sz="1300" dirty="0"/>
             </a:p>
@@ -33850,11 +33720,7 @@
               </a:pPr>
               <a:r>
                 <a:rPr lang="en-GB" sz="1300" dirty="0" smtClean="0"/>
-                <a:t>Custome</a:t>
-              </a:r>
-              <a:r>
-                <a:rPr lang="en-GB" sz="1300" dirty="0" smtClean="0"/>
-                <a:t>r C</a:t>
+                <a:t>Customer C</a:t>
               </a:r>
               <a:endParaRPr lang="en-US" sz="1300" dirty="0"/>
             </a:p>
@@ -37129,11 +36995,7 @@
             </a:pPr>
             <a:r>
               <a:rPr lang="en-GB" sz="1300" dirty="0" smtClean="0"/>
-              <a:t>16</a:t>
-            </a:r>
-            <a:r>
-              <a:rPr lang="en-GB" sz="1300" dirty="0" smtClean="0"/>
-              <a:t>.94% </a:t>
+              <a:t>16.94% </a:t>
             </a:r>
           </a:p>
           <a:p>
@@ -37429,11 +37291,7 @@
             </a:pPr>
             <a:r>
               <a:rPr lang="en-GB" sz="1300" dirty="0" smtClean="0"/>
-              <a:t>The purely behaviour based model </a:t>
-            </a:r>
-            <a:r>
-              <a:rPr lang="en-GB" sz="1300" dirty="0" smtClean="0"/>
-              <a:t>infer 4 clusters:</a:t>
+              <a:t>The purely behaviour based model infer 4 clusters:</a:t>
             </a:r>
           </a:p>
           <a:p>

</xml_diff>